<commit_message>
Exploration and practice  - see IndyCode Evernote
</commit_message>
<xml_diff>
--- a/Habits/JavaScript Highly Effective.pptx
+++ b/Habits/JavaScript Highly Effective.pptx
@@ -150,6 +150,22 @@
       </a:defRPr>
     </a:lvl9pPr>
   </p:defaultTextStyle>
+  <p:extLst>
+    <p:ext uri="{EFAFB233-063F-42B5-8137-9DF3F51BA10A}">
+      <p15:sldGuideLst xmlns:p15="http://schemas.microsoft.com/office/powerpoint/2012/main">
+        <p15:guide id="1" orient="horz" pos="1620">
+          <p15:clr>
+            <a:srgbClr val="A4A3A4"/>
+          </p15:clr>
+        </p15:guide>
+        <p15:guide id="2" pos="2880">
+          <p15:clr>
+            <a:srgbClr val="A4A3A4"/>
+          </p15:clr>
+        </p15:guide>
+      </p15:sldGuideLst>
+    </p:ext>
+  </p:extLst>
 </p:presentation>
 </file>
 
@@ -235,7 +251,7 @@
           <a:p>
             <a:fld id="{517BD681-2138-D843-A8DE-90B1DD20C580}" type="datetimeFigureOut">
               <a:rPr lang="en-US" smtClean="0"/>
-              <a:t>4/12/16</a:t>
+              <a:t>4/14/2017</a:t>
             </a:fld>
             <a:endParaRPr lang="en-US"/>
           </a:p>
@@ -2216,7 +2232,7 @@
           <a:p>
             <a:fld id="{248FC528-4CB9-EB43-816D-1A916AA8DC0F}" type="datetimeFigureOut">
               <a:rPr lang="en-US" smtClean="0"/>
-              <a:t>4/12/16</a:t>
+              <a:t>4/14/2017</a:t>
             </a:fld>
             <a:endParaRPr lang="en-US"/>
           </a:p>
@@ -2386,7 +2402,7 @@
           <a:p>
             <a:fld id="{248FC528-4CB9-EB43-816D-1A916AA8DC0F}" type="datetimeFigureOut">
               <a:rPr lang="en-US" smtClean="0"/>
-              <a:t>4/12/16</a:t>
+              <a:t>4/14/2017</a:t>
             </a:fld>
             <a:endParaRPr lang="en-US"/>
           </a:p>
@@ -2566,7 +2582,7 @@
           <a:p>
             <a:fld id="{248FC528-4CB9-EB43-816D-1A916AA8DC0F}" type="datetimeFigureOut">
               <a:rPr lang="en-US" smtClean="0"/>
-              <a:t>4/12/16</a:t>
+              <a:t>4/14/2017</a:t>
             </a:fld>
             <a:endParaRPr lang="en-US"/>
           </a:p>
@@ -2946,7 +2962,7 @@
   <p:timing>
     <p:tnLst>
       <p:par>
-        <p:cTn xmlns:p14="http://schemas.microsoft.com/office/powerpoint/2010/main" id="1" dur="indefinite" restart="never" nodeType="tmRoot">
+        <p:cTn id="1" dur="indefinite" restart="never" nodeType="tmRoot">
           <p:childTnLst>
             <p:seq concurrent="1" nextAc="seek">
               <p:cTn id="2" dur="indefinite" nodeType="mainSeq">
@@ -3323,7 +3339,7 @@
           <p:tmpl lvl="1">
             <p:tnLst>
               <p:par>
-                <p:cTn xmlns:p14="http://schemas.microsoft.com/office/powerpoint/2010/main" presetID="1" presetClass="entr" presetSubtype="0" fill="hold" nodeType="clickEffect">
+                <p:cTn presetID="1" presetClass="entr" presetSubtype="0" fill="hold" nodeType="clickEffect">
                   <p:stCondLst>
                     <p:cond delay="0"/>
                   </p:stCondLst>
@@ -3370,7 +3386,7 @@
           <p:tmpl lvl="2">
             <p:tnLst>
               <p:par>
-                <p:cTn xmlns:p14="http://schemas.microsoft.com/office/powerpoint/2010/main" presetID="1" presetClass="entr" presetSubtype="0" fill="hold" nodeType="clickEffect">
+                <p:cTn presetID="1" presetClass="entr" presetSubtype="0" fill="hold" nodeType="clickEffect">
                   <p:stCondLst>
                     <p:cond delay="0"/>
                   </p:stCondLst>
@@ -3417,7 +3433,7 @@
           <p:tmpl lvl="3">
             <p:tnLst>
               <p:par>
-                <p:cTn xmlns:p14="http://schemas.microsoft.com/office/powerpoint/2010/main" presetID="1" presetClass="entr" presetSubtype="0" fill="hold" nodeType="clickEffect">
+                <p:cTn presetID="1" presetClass="entr" presetSubtype="0" fill="hold" nodeType="clickEffect">
                   <p:stCondLst>
                     <p:cond delay="0"/>
                   </p:stCondLst>
@@ -3464,7 +3480,7 @@
           <p:tmpl lvl="4">
             <p:tnLst>
               <p:par>
-                <p:cTn xmlns:p14="http://schemas.microsoft.com/office/powerpoint/2010/main" presetID="1" presetClass="entr" presetSubtype="0" fill="hold" nodeType="clickEffect">
+                <p:cTn presetID="1" presetClass="entr" presetSubtype="0" fill="hold" nodeType="clickEffect">
                   <p:stCondLst>
                     <p:cond delay="0"/>
                   </p:stCondLst>
@@ -3511,7 +3527,7 @@
           <p:tmpl lvl="5">
             <p:tnLst>
               <p:par>
-                <p:cTn xmlns:p14="http://schemas.microsoft.com/office/powerpoint/2010/main" presetID="1" presetClass="entr" presetSubtype="0" fill="hold" nodeType="clickEffect">
+                <p:cTn presetID="1" presetClass="entr" presetSubtype="0" fill="hold" nodeType="clickEffect">
                   <p:stCondLst>
                     <p:cond delay="0"/>
                   </p:stCondLst>
@@ -3558,7 +3574,7 @@
           <p:tmpl lvl="6">
             <p:tnLst>
               <p:par>
-                <p:cTn xmlns:p14="http://schemas.microsoft.com/office/powerpoint/2010/main" presetID="1" presetClass="entr" presetSubtype="0" fill="hold" nodeType="clickEffect">
+                <p:cTn presetID="1" presetClass="entr" presetSubtype="0" fill="hold" nodeType="clickEffect">
                   <p:stCondLst>
                     <p:cond delay="0"/>
                   </p:stCondLst>
@@ -3589,7 +3605,7 @@
           <p:tmpl lvl="7">
             <p:tnLst>
               <p:par>
-                <p:cTn xmlns:p14="http://schemas.microsoft.com/office/powerpoint/2010/main" presetID="1" presetClass="entr" presetSubtype="0" fill="hold" nodeType="withEffect">
+                <p:cTn presetID="1" presetClass="entr" presetSubtype="0" fill="hold" nodeType="withEffect">
                   <p:stCondLst>
                     <p:cond delay="0"/>
                   </p:stCondLst>
@@ -3636,7 +3652,7 @@
           <p:tmpl lvl="8">
             <p:tnLst>
               <p:par>
-                <p:cTn xmlns:p14="http://schemas.microsoft.com/office/powerpoint/2010/main" presetID="1" presetClass="entr" presetSubtype="0" fill="hold" nodeType="withEffect">
+                <p:cTn presetID="1" presetClass="entr" presetSubtype="0" fill="hold" nodeType="withEffect">
                   <p:stCondLst>
                     <p:cond delay="0"/>
                   </p:stCondLst>
@@ -3683,7 +3699,7 @@
           <p:tmpl lvl="9">
             <p:tnLst>
               <p:par>
-                <p:cTn xmlns:p14="http://schemas.microsoft.com/office/powerpoint/2010/main" presetID="1" presetClass="entr" presetSubtype="0" fill="hold" nodeType="withEffect">
+                <p:cTn presetID="1" presetClass="entr" presetSubtype="0" fill="hold" nodeType="withEffect">
                   <p:stCondLst>
                     <p:cond delay="0"/>
                   </p:stCondLst>
@@ -3833,7 +3849,7 @@
   <p:timing>
     <p:tnLst>
       <p:par>
-        <p:cTn xmlns:p14="http://schemas.microsoft.com/office/powerpoint/2010/main" id="1" dur="indefinite" restart="never" nodeType="tmRoot"/>
+        <p:cTn id="1" dur="indefinite" restart="never" nodeType="tmRoot"/>
       </p:par>
     </p:tnLst>
   </p:timing>
@@ -3969,13 +3985,13 @@
   <p:timing>
     <p:tnLst>
       <p:par>
-        <p:cTn xmlns:p14="http://schemas.microsoft.com/office/powerpoint/2010/main" id="1" dur="indefinite" restart="never" nodeType="tmRoot"/>
+        <p:cTn id="1" dur="indefinite" restart="never" nodeType="tmRoot"/>
       </p:par>
     </p:tnLst>
   </p:timing>
   <p:extLst mod="1">
     <p:ext uri="{DCECCB84-F9BA-43D5-87BE-67443E8EF086}">
-      <p15:sldGuideLst xmlns:p15="http://schemas.microsoft.com/office/powerpoint/2012/main" xmlns="">
+      <p15:sldGuideLst xmlns:p15="http://schemas.microsoft.com/office/powerpoint/2012/main">
         <p15:guide id="1" orient="horz" pos="2160">
           <p15:clr>
             <a:srgbClr val="FBAE40"/>
@@ -4203,7 +4219,7 @@
   <p:timing>
     <p:tnLst>
       <p:par>
-        <p:cTn xmlns:p14="http://schemas.microsoft.com/office/powerpoint/2010/main" id="1" dur="indefinite" restart="never" nodeType="tmRoot"/>
+        <p:cTn id="1" dur="indefinite" restart="never" nodeType="tmRoot"/>
       </p:par>
     </p:tnLst>
   </p:timing>
@@ -4319,7 +4335,7 @@
           <a:p>
             <a:fld id="{248FC528-4CB9-EB43-816D-1A916AA8DC0F}" type="datetimeFigureOut">
               <a:rPr lang="en-US" smtClean="0"/>
-              <a:t>4/12/16</a:t>
+              <a:t>4/14/2017</a:t>
             </a:fld>
             <a:endParaRPr lang="en-US"/>
           </a:p>
@@ -4565,7 +4581,7 @@
           <a:p>
             <a:fld id="{248FC528-4CB9-EB43-816D-1A916AA8DC0F}" type="datetimeFigureOut">
               <a:rPr lang="en-US" smtClean="0"/>
-              <a:t>4/12/16</a:t>
+              <a:t>4/14/2017</a:t>
             </a:fld>
             <a:endParaRPr lang="en-US"/>
           </a:p>
@@ -4853,7 +4869,7 @@
           <a:p>
             <a:fld id="{248FC528-4CB9-EB43-816D-1A916AA8DC0F}" type="datetimeFigureOut">
               <a:rPr lang="en-US" smtClean="0"/>
-              <a:t>4/12/16</a:t>
+              <a:t>4/14/2017</a:t>
             </a:fld>
             <a:endParaRPr lang="en-US"/>
           </a:p>
@@ -5280,7 +5296,7 @@
           <a:p>
             <a:fld id="{248FC528-4CB9-EB43-816D-1A916AA8DC0F}" type="datetimeFigureOut">
               <a:rPr lang="en-US" smtClean="0"/>
-              <a:t>4/12/16</a:t>
+              <a:t>4/14/2017</a:t>
             </a:fld>
             <a:endParaRPr lang="en-US"/>
           </a:p>
@@ -5398,7 +5414,7 @@
           <a:p>
             <a:fld id="{248FC528-4CB9-EB43-816D-1A916AA8DC0F}" type="datetimeFigureOut">
               <a:rPr lang="en-US" smtClean="0"/>
-              <a:t>4/12/16</a:t>
+              <a:t>4/14/2017</a:t>
             </a:fld>
             <a:endParaRPr lang="en-US"/>
           </a:p>
@@ -5493,7 +5509,7 @@
           <a:p>
             <a:fld id="{248FC528-4CB9-EB43-816D-1A916AA8DC0F}" type="datetimeFigureOut">
               <a:rPr lang="en-US" smtClean="0"/>
-              <a:t>4/12/16</a:t>
+              <a:t>4/14/2017</a:t>
             </a:fld>
             <a:endParaRPr lang="en-US"/>
           </a:p>
@@ -5770,7 +5786,7 @@
           <a:p>
             <a:fld id="{248FC528-4CB9-EB43-816D-1A916AA8DC0F}" type="datetimeFigureOut">
               <a:rPr lang="en-US" smtClean="0"/>
-              <a:t>4/12/16</a:t>
+              <a:t>4/14/2017</a:t>
             </a:fld>
             <a:endParaRPr lang="en-US"/>
           </a:p>
@@ -6023,7 +6039,7 @@
           <a:p>
             <a:fld id="{248FC528-4CB9-EB43-816D-1A916AA8DC0F}" type="datetimeFigureOut">
               <a:rPr lang="en-US" smtClean="0"/>
-              <a:t>4/12/16</a:t>
+              <a:t>4/14/2017</a:t>
             </a:fld>
             <a:endParaRPr lang="en-US"/>
           </a:p>
@@ -6236,7 +6252,7 @@
           <a:p>
             <a:fld id="{248FC528-4CB9-EB43-816D-1A916AA8DC0F}" type="datetimeFigureOut">
               <a:rPr lang="en-US" smtClean="0"/>
-              <a:t>4/12/16</a:t>
+              <a:t>4/14/2017</a:t>
             </a:fld>
             <a:endParaRPr lang="en-US"/>
           </a:p>
@@ -6790,7 +6806,7 @@
   <p:timing>
     <p:tnLst>
       <p:par>
-        <p:cTn xmlns:p14="http://schemas.microsoft.com/office/powerpoint/2010/main" id="1" dur="indefinite" restart="never" nodeType="tmRoot"/>
+        <p:cTn id="1" dur="indefinite" restart="never" nodeType="tmRoot"/>
       </p:par>
     </p:tnLst>
   </p:timing>
@@ -6878,7 +6894,7 @@
   <p:timing>
     <p:tnLst>
       <p:par>
-        <p:cTn xmlns:p14="http://schemas.microsoft.com/office/powerpoint/2010/main" id="1" dur="indefinite" restart="never" nodeType="tmRoot"/>
+        <p:cTn id="1" dur="indefinite" restart="never" nodeType="tmRoot"/>
       </p:par>
     </p:tnLst>
   </p:timing>
@@ -6966,7 +6982,7 @@
   <p:timing>
     <p:tnLst>
       <p:par>
-        <p:cTn xmlns:p14="http://schemas.microsoft.com/office/powerpoint/2010/main" id="1" dur="indefinite" restart="never" nodeType="tmRoot"/>
+        <p:cTn id="1" dur="indefinite" restart="never" nodeType="tmRoot"/>
       </p:par>
     </p:tnLst>
   </p:timing>
@@ -7088,7 +7104,7 @@
   <p:timing>
     <p:tnLst>
       <p:par>
-        <p:cTn xmlns:p14="http://schemas.microsoft.com/office/powerpoint/2010/main" id="1" dur="indefinite" restart="never" nodeType="tmRoot"/>
+        <p:cTn id="1" dur="indefinite" restart="never" nodeType="tmRoot"/>
       </p:par>
     </p:tnLst>
   </p:timing>
@@ -7192,7 +7208,7 @@
   <p:timing>
     <p:tnLst>
       <p:par>
-        <p:cTn xmlns:p14="http://schemas.microsoft.com/office/powerpoint/2010/main" id="1" dur="indefinite" restart="never" nodeType="tmRoot"/>
+        <p:cTn id="1" dur="indefinite" restart="never" nodeType="tmRoot"/>
       </p:par>
     </p:tnLst>
   </p:timing>
@@ -7293,7 +7309,7 @@
   <p:timing>
     <p:tnLst>
       <p:par>
-        <p:cTn xmlns:p14="http://schemas.microsoft.com/office/powerpoint/2010/main" id="1" dur="indefinite" restart="never" nodeType="tmRoot"/>
+        <p:cTn id="1" dur="indefinite" restart="never" nodeType="tmRoot"/>
       </p:par>
     </p:tnLst>
   </p:timing>
@@ -7750,7 +7766,7 @@
   <p:timing>
     <p:tnLst>
       <p:par>
-        <p:cTn xmlns:p14="http://schemas.microsoft.com/office/powerpoint/2010/main" id="1" dur="indefinite" restart="never" nodeType="tmRoot"/>
+        <p:cTn id="1" dur="indefinite" restart="never" nodeType="tmRoot"/>
       </p:par>
     </p:tnLst>
   </p:timing>
@@ -8241,7 +8257,7 @@
   <p:timing>
     <p:tnLst>
       <p:par>
-        <p:cTn xmlns:p14="http://schemas.microsoft.com/office/powerpoint/2010/main" id="1" dur="indefinite" restart="never" nodeType="tmRoot"/>
+        <p:cTn id="1" dur="indefinite" restart="never" nodeType="tmRoot"/>
       </p:par>
     </p:tnLst>
   </p:timing>
@@ -8906,7 +8922,7 @@
   <p:timing>
     <p:tnLst>
       <p:par>
-        <p:cTn xmlns:p14="http://schemas.microsoft.com/office/powerpoint/2010/main" id="1" dur="indefinite" restart="never" nodeType="tmRoot"/>
+        <p:cTn id="1" dur="indefinite" restart="never" nodeType="tmRoot"/>
       </p:par>
     </p:tnLst>
   </p:timing>
@@ -9591,7 +9607,7 @@
   <p:timing>
     <p:tnLst>
       <p:par>
-        <p:cTn xmlns:p14="http://schemas.microsoft.com/office/powerpoint/2010/main" id="1" dur="indefinite" restart="never" nodeType="tmRoot"/>
+        <p:cTn id="1" dur="indefinite" restart="never" nodeType="tmRoot"/>
       </p:par>
     </p:tnLst>
   </p:timing>
@@ -10229,7 +10245,7 @@
   <p:timing>
     <p:tnLst>
       <p:par>
-        <p:cTn xmlns:p14="http://schemas.microsoft.com/office/powerpoint/2010/main" id="1" dur="indefinite" restart="never" nodeType="tmRoot"/>
+        <p:cTn id="1" dur="indefinite" restart="never" nodeType="tmRoot"/>
       </p:par>
     </p:tnLst>
   </p:timing>
@@ -10364,7 +10380,7 @@
   <p:timing>
     <p:tnLst>
       <p:par>
-        <p:cTn xmlns:p14="http://schemas.microsoft.com/office/powerpoint/2010/main" id="1" dur="indefinite" restart="never" nodeType="tmRoot"/>
+        <p:cTn id="1" dur="indefinite" restart="never" nodeType="tmRoot"/>
       </p:par>
     </p:tnLst>
   </p:timing>
@@ -11022,7 +11038,7 @@
   <p:timing>
     <p:tnLst>
       <p:par>
-        <p:cTn xmlns:p14="http://schemas.microsoft.com/office/powerpoint/2010/main" id="1" dur="indefinite" restart="never" nodeType="tmRoot"/>
+        <p:cTn id="1" dur="indefinite" restart="never" nodeType="tmRoot"/>
       </p:par>
     </p:tnLst>
   </p:timing>
@@ -11412,7 +11428,7 @@
   <p:timing>
     <p:tnLst>
       <p:par>
-        <p:cTn xmlns:p14="http://schemas.microsoft.com/office/powerpoint/2010/main" id="1" dur="indefinite" restart="never" nodeType="tmRoot"/>
+        <p:cTn id="1" dur="indefinite" restart="never" nodeType="tmRoot"/>
       </p:par>
     </p:tnLst>
   </p:timing>
@@ -11843,7 +11859,7 @@
   <p:timing>
     <p:tnLst>
       <p:par>
-        <p:cTn xmlns:p14="http://schemas.microsoft.com/office/powerpoint/2010/main" id="1" dur="indefinite" restart="never" nodeType="tmRoot"/>
+        <p:cTn id="1" dur="indefinite" restart="never" nodeType="tmRoot"/>
       </p:par>
     </p:tnLst>
   </p:timing>
@@ -11910,7 +11926,7 @@
   <p:timing>
     <p:tnLst>
       <p:par>
-        <p:cTn xmlns:p14="http://schemas.microsoft.com/office/powerpoint/2010/main" id="1" dur="indefinite" restart="never" nodeType="tmRoot"/>
+        <p:cTn id="1" dur="indefinite" restart="never" nodeType="tmRoot"/>
       </p:par>
     </p:tnLst>
   </p:timing>
@@ -12553,7 +12569,7 @@
   <p:timing>
     <p:tnLst>
       <p:par>
-        <p:cTn xmlns:p14="http://schemas.microsoft.com/office/powerpoint/2010/main" id="1" dur="indefinite" restart="never" nodeType="tmRoot"/>
+        <p:cTn id="1" dur="indefinite" restart="never" nodeType="tmRoot"/>
       </p:par>
     </p:tnLst>
   </p:timing>
@@ -13195,7 +13211,7 @@
   <p:timing>
     <p:tnLst>
       <p:par>
-        <p:cTn xmlns:p14="http://schemas.microsoft.com/office/powerpoint/2010/main" id="1" dur="indefinite" restart="never" nodeType="tmRoot"/>
+        <p:cTn id="1" dur="indefinite" restart="never" nodeType="tmRoot"/>
       </p:par>
     </p:tnLst>
   </p:timing>
@@ -13879,7 +13895,7 @@
   <p:timing>
     <p:tnLst>
       <p:par>
-        <p:cTn xmlns:p14="http://schemas.microsoft.com/office/powerpoint/2010/main" id="1" dur="indefinite" restart="never" nodeType="tmRoot"/>
+        <p:cTn id="1" dur="indefinite" restart="never" nodeType="tmRoot"/>
       </p:par>
     </p:tnLst>
   </p:timing>
@@ -14573,7 +14589,7 @@
   <p:timing>
     <p:tnLst>
       <p:par>
-        <p:cTn xmlns:p14="http://schemas.microsoft.com/office/powerpoint/2010/main" id="1" dur="indefinite" restart="never" nodeType="tmRoot"/>
+        <p:cTn id="1" dur="indefinite" restart="never" nodeType="tmRoot"/>
       </p:par>
     </p:tnLst>
   </p:timing>
@@ -15267,7 +15283,7 @@
   <p:timing>
     <p:tnLst>
       <p:par>
-        <p:cTn xmlns:p14="http://schemas.microsoft.com/office/powerpoint/2010/main" id="1" dur="indefinite" restart="never" nodeType="tmRoot"/>
+        <p:cTn id="1" dur="indefinite" restart="never" nodeType="tmRoot"/>
       </p:par>
     </p:tnLst>
   </p:timing>
@@ -15962,7 +15978,7 @@
   <p:timing>
     <p:tnLst>
       <p:par>
-        <p:cTn xmlns:p14="http://schemas.microsoft.com/office/powerpoint/2010/main" id="1" dur="indefinite" restart="never" nodeType="tmRoot"/>
+        <p:cTn id="1" dur="indefinite" restart="never" nodeType="tmRoot"/>
       </p:par>
     </p:tnLst>
   </p:timing>
@@ -16063,7 +16079,7 @@
   <p:timing>
     <p:tnLst>
       <p:par>
-        <p:cTn xmlns:p14="http://schemas.microsoft.com/office/powerpoint/2010/main" id="1" dur="indefinite" restart="never" nodeType="tmRoot"/>
+        <p:cTn id="1" dur="indefinite" restart="never" nodeType="tmRoot"/>
       </p:par>
     </p:tnLst>
   </p:timing>
@@ -16198,7 +16214,7 @@
   <p:timing>
     <p:tnLst>
       <p:par>
-        <p:cTn xmlns:p14="http://schemas.microsoft.com/office/powerpoint/2010/main" id="1" dur="indefinite" restart="never" nodeType="tmRoot"/>
+        <p:cTn id="1" dur="indefinite" restart="never" nodeType="tmRoot"/>
       </p:par>
     </p:tnLst>
   </p:timing>
@@ -16266,7 +16282,7 @@
   <p:timing>
     <p:tnLst>
       <p:par>
-        <p:cTn xmlns:p14="http://schemas.microsoft.com/office/powerpoint/2010/main" id="1" dur="indefinite" restart="never" nodeType="tmRoot"/>
+        <p:cTn id="1" dur="indefinite" restart="never" nodeType="tmRoot"/>
       </p:par>
     </p:tnLst>
   </p:timing>
@@ -16342,7 +16358,7 @@
   <p:timing>
     <p:tnLst>
       <p:par>
-        <p:cTn xmlns:p14="http://schemas.microsoft.com/office/powerpoint/2010/main" id="1" dur="indefinite" restart="never" nodeType="tmRoot"/>
+        <p:cTn id="1" dur="indefinite" restart="never" nodeType="tmRoot"/>
       </p:par>
     </p:tnLst>
   </p:timing>
@@ -16412,7 +16428,7 @@
   <p:timing>
     <p:tnLst>
       <p:par>
-        <p:cTn xmlns:p14="http://schemas.microsoft.com/office/powerpoint/2010/main" id="1" dur="indefinite" restart="never" nodeType="tmRoot"/>
+        <p:cTn id="1" dur="indefinite" restart="never" nodeType="tmRoot"/>
       </p:par>
     </p:tnLst>
   </p:timing>
@@ -16538,7 +16554,7 @@
   <p:timing>
     <p:tnLst>
       <p:par>
-        <p:cTn xmlns:p14="http://schemas.microsoft.com/office/powerpoint/2010/main" id="1" dur="indefinite" restart="never" nodeType="tmRoot"/>
+        <p:cTn id="1" dur="indefinite" restart="never" nodeType="tmRoot"/>
       </p:par>
     </p:tnLst>
   </p:timing>
@@ -16613,7 +16629,7 @@
   <p:timing>
     <p:tnLst>
       <p:par>
-        <p:cTn xmlns:p14="http://schemas.microsoft.com/office/powerpoint/2010/main" id="1" dur="indefinite" restart="never" nodeType="tmRoot"/>
+        <p:cTn id="1" dur="indefinite" restart="never" nodeType="tmRoot"/>
       </p:par>
     </p:tnLst>
   </p:timing>
@@ -16688,7 +16704,7 @@
   <p:timing>
     <p:tnLst>
       <p:par>
-        <p:cTn xmlns:p14="http://schemas.microsoft.com/office/powerpoint/2010/main" id="1" dur="indefinite" restart="never" nodeType="tmRoot"/>
+        <p:cTn id="1" dur="indefinite" restart="never" nodeType="tmRoot"/>
       </p:par>
     </p:tnLst>
   </p:timing>
@@ -16755,7 +16771,7 @@
   <p:timing>
     <p:tnLst>
       <p:par>
-        <p:cTn xmlns:p14="http://schemas.microsoft.com/office/powerpoint/2010/main" id="1" dur="indefinite" restart="never" nodeType="tmRoot"/>
+        <p:cTn id="1" dur="indefinite" restart="never" nodeType="tmRoot"/>
       </p:par>
     </p:tnLst>
   </p:timing>
@@ -16823,7 +16839,7 @@
   <p:timing>
     <p:tnLst>
       <p:par>
-        <p:cTn xmlns:p14="http://schemas.microsoft.com/office/powerpoint/2010/main" id="1" dur="indefinite" restart="never" nodeType="tmRoot"/>
+        <p:cTn id="1" dur="indefinite" restart="never" nodeType="tmRoot"/>
       </p:par>
     </p:tnLst>
   </p:timing>
@@ -16893,7 +16909,7 @@
   <p:timing>
     <p:tnLst>
       <p:par>
-        <p:cTn xmlns:p14="http://schemas.microsoft.com/office/powerpoint/2010/main" id="1" dur="indefinite" restart="never" nodeType="tmRoot"/>
+        <p:cTn id="1" dur="indefinite" restart="never" nodeType="tmRoot"/>
       </p:par>
     </p:tnLst>
   </p:timing>
@@ -16975,7 +16991,7 @@
   <p:timing>
     <p:tnLst>
       <p:par>
-        <p:cTn xmlns:p14="http://schemas.microsoft.com/office/powerpoint/2010/main" id="1" dur="indefinite" restart="never" nodeType="tmRoot"/>
+        <p:cTn id="1" dur="indefinite" restart="never" nodeType="tmRoot"/>
       </p:par>
     </p:tnLst>
   </p:timing>
@@ -17043,7 +17059,7 @@
   <p:timing>
     <p:tnLst>
       <p:par>
-        <p:cTn xmlns:p14="http://schemas.microsoft.com/office/powerpoint/2010/main" id="1" dur="indefinite" restart="never" nodeType="tmRoot"/>
+        <p:cTn id="1" dur="indefinite" restart="never" nodeType="tmRoot"/>
       </p:par>
     </p:tnLst>
   </p:timing>
@@ -17328,7 +17344,7 @@
   <p:timing>
     <p:tnLst>
       <p:par>
-        <p:cTn xmlns:p14="http://schemas.microsoft.com/office/powerpoint/2010/main" id="1" dur="indefinite" restart="never" nodeType="tmRoot"/>
+        <p:cTn id="1" dur="indefinite" restart="never" nodeType="tmRoot"/>
       </p:par>
     </p:tnLst>
   </p:timing>
@@ -17396,7 +17412,7 @@
   <p:timing>
     <p:tnLst>
       <p:par>
-        <p:cTn xmlns:p14="http://schemas.microsoft.com/office/powerpoint/2010/main" id="1" dur="indefinite" restart="never" nodeType="tmRoot"/>
+        <p:cTn id="1" dur="indefinite" restart="never" nodeType="tmRoot"/>
       </p:par>
     </p:tnLst>
   </p:timing>
@@ -17724,7 +17740,7 @@
   <p:timing>
     <p:tnLst>
       <p:par>
-        <p:cTn xmlns:p14="http://schemas.microsoft.com/office/powerpoint/2010/main" id="1" dur="indefinite" restart="never" nodeType="tmRoot"/>
+        <p:cTn id="1" dur="indefinite" restart="never" nodeType="tmRoot"/>
       </p:par>
     </p:tnLst>
   </p:timing>
@@ -17923,7 +17939,7 @@
   <p:timing>
     <p:tnLst>
       <p:par>
-        <p:cTn xmlns:p14="http://schemas.microsoft.com/office/powerpoint/2010/main" id="1" dur="indefinite" restart="never" nodeType="tmRoot"/>
+        <p:cTn id="1" dur="indefinite" restart="never" nodeType="tmRoot"/>
       </p:par>
     </p:tnLst>
   </p:timing>
@@ -18004,7 +18020,7 @@
   <p:timing>
     <p:tnLst>
       <p:par>
-        <p:cTn xmlns:p14="http://schemas.microsoft.com/office/powerpoint/2010/main" id="1" dur="indefinite" restart="never" nodeType="tmRoot"/>
+        <p:cTn id="1" dur="indefinite" restart="never" nodeType="tmRoot"/>
       </p:par>
     </p:tnLst>
   </p:timing>
@@ -18092,7 +18108,7 @@
   <p:timing>
     <p:tnLst>
       <p:par>
-        <p:cTn xmlns:p14="http://schemas.microsoft.com/office/powerpoint/2010/main" id="1" dur="indefinite" restart="never" nodeType="tmRoot"/>
+        <p:cTn id="1" dur="indefinite" restart="never" nodeType="tmRoot"/>
       </p:par>
     </p:tnLst>
   </p:timing>
@@ -18173,7 +18189,7 @@
   <p:timing>
     <p:tnLst>
       <p:par>
-        <p:cTn xmlns:p14="http://schemas.microsoft.com/office/powerpoint/2010/main" id="1" dur="indefinite" restart="never" nodeType="tmRoot"/>
+        <p:cTn id="1" dur="indefinite" restart="never" nodeType="tmRoot"/>
       </p:par>
     </p:tnLst>
   </p:timing>
@@ -18261,7 +18277,7 @@
   <p:timing>
     <p:tnLst>
       <p:par>
-        <p:cTn xmlns:p14="http://schemas.microsoft.com/office/powerpoint/2010/main" id="1" dur="indefinite" restart="never" nodeType="tmRoot"/>
+        <p:cTn id="1" dur="indefinite" restart="never" nodeType="tmRoot"/>
       </p:par>
     </p:tnLst>
   </p:timing>
@@ -18342,7 +18358,7 @@
   <p:timing>
     <p:tnLst>
       <p:par>
-        <p:cTn xmlns:p14="http://schemas.microsoft.com/office/powerpoint/2010/main" id="1" dur="indefinite" restart="never" nodeType="tmRoot"/>
+        <p:cTn id="1" dur="indefinite" restart="never" nodeType="tmRoot"/>
       </p:par>
     </p:tnLst>
   </p:timing>

</xml_diff>